<commit_message>
adedd changes to presentation
</commit_message>
<xml_diff>
--- a/report/OptimalFinalPresentation.pptx
+++ b/report/OptimalFinalPresentation.pptx
@@ -280,7 +280,7 @@
           <a:p>
             <a:fld id="{6D72FF73-3B8F-A544-A0A0-42F2B80C88BC}" type="datetimeFigureOut">
               <a:rPr lang="en-US" smtClean="0"/>
-              <a:t>5/3/2025</a:t>
+              <a:t>5/5/2025</a:t>
             </a:fld>
             <a:endParaRPr lang="en-US" dirty="0"/>
           </a:p>
@@ -18998,11 +18998,11 @@
   <p:clrMapOvr>
     <a:masterClrMapping/>
   </p:clrMapOvr>
-  <mc:AlternateContent xmlns:mc="http://schemas.openxmlformats.org/markup-compatibility/2006">
-    <mc:Choice xmlns:p14="http://schemas.microsoft.com/office/powerpoint/2010/main" Requires="p14">
+  <mc:AlternateContent xmlns:mc="http://schemas.openxmlformats.org/markup-compatibility/2006" xmlns:p14="http://schemas.microsoft.com/office/powerpoint/2010/main">
+    <mc:Choice Requires="p14">
       <p:transition p14:dur="0"/>
     </mc:Choice>
-    <mc:Fallback>
+    <mc:Fallback xmlns="">
       <p:transition/>
     </mc:Fallback>
   </mc:AlternateContent>
@@ -19658,8 +19658,8 @@
           </a:p>
         </p:txBody>
       </p:sp>
-      <mc:AlternateContent xmlns:mc="http://schemas.openxmlformats.org/markup-compatibility/2006">
-        <mc:Choice xmlns:a14="http://schemas.microsoft.com/office/drawing/2010/main" Requires="a14">
+      <mc:AlternateContent xmlns:mc="http://schemas.openxmlformats.org/markup-compatibility/2006" xmlns:a14="http://schemas.microsoft.com/office/drawing/2010/main">
+        <mc:Choice Requires="a14">
           <p:sp>
             <p:nvSpPr>
               <p:cNvPr id="40" name="Text Placeholder 39">
@@ -19775,7 +19775,7 @@
             </p:txBody>
           </p:sp>
         </mc:Choice>
-        <mc:Fallback>
+        <mc:Fallback xmlns="">
           <p:sp>
             <p:nvSpPr>
               <p:cNvPr id="40" name="Text Placeholder 39">
@@ -19873,8 +19873,8 @@
           <a:fontRef idx="none"/>
         </p:style>
       </p:cxnSp>
-      <mc:AlternateContent xmlns:mc="http://schemas.openxmlformats.org/markup-compatibility/2006">
-        <mc:Choice xmlns:a14="http://schemas.microsoft.com/office/drawing/2010/main" Requires="a14">
+      <mc:AlternateContent xmlns:mc="http://schemas.openxmlformats.org/markup-compatibility/2006" xmlns:a14="http://schemas.microsoft.com/office/drawing/2010/main">
+        <mc:Choice Requires="a14">
           <p:sp>
             <p:nvSpPr>
               <p:cNvPr id="11" name="Text Placeholder 39">
@@ -20147,7 +20147,7 @@
             </p:txBody>
           </p:sp>
         </mc:Choice>
-        <mc:Fallback>
+        <mc:Fallback xmlns="">
           <p:sp>
             <p:nvSpPr>
               <p:cNvPr id="11" name="Text Placeholder 39">
@@ -21048,11 +21048,11 @@
   <p:clrMapOvr>
     <a:masterClrMapping/>
   </p:clrMapOvr>
-  <mc:AlternateContent xmlns:mc="http://schemas.openxmlformats.org/markup-compatibility/2006">
-    <mc:Choice xmlns:p14="http://schemas.microsoft.com/office/powerpoint/2010/main" Requires="p14">
+  <mc:AlternateContent xmlns:mc="http://schemas.openxmlformats.org/markup-compatibility/2006" xmlns:p14="http://schemas.microsoft.com/office/powerpoint/2010/main">
+    <mc:Choice Requires="p14">
       <p:transition p14:dur="0"/>
     </mc:Choice>
-    <mc:Fallback>
+    <mc:Fallback xmlns="">
       <p:transition/>
     </mc:Fallback>
   </mc:AlternateContent>
@@ -21581,6 +21581,124 @@
           </a:p>
         </p:txBody>
       </p:sp>
+      <p:sp>
+        <p:nvSpPr>
+          <p:cNvPr id="5" name="TextBox 4">
+            <a:extLst>
+              <a:ext uri="{FF2B5EF4-FFF2-40B4-BE49-F238E27FC236}">
+                <a16:creationId xmlns:a16="http://schemas.microsoft.com/office/drawing/2014/main" id="{59DD0900-8135-E1C7-7F50-B66D8DA196E6}"/>
+              </a:ext>
+            </a:extLst>
+          </p:cNvPr>
+          <p:cNvSpPr txBox="1"/>
+          <p:nvPr/>
+        </p:nvSpPr>
+        <p:spPr>
+          <a:xfrm>
+            <a:off x="135540" y="1102221"/>
+            <a:ext cx="11026882" cy="1202741"/>
+          </a:xfrm>
+          <a:prstGeom prst="rect">
+            <a:avLst/>
+          </a:prstGeom>
+          <a:noFill/>
+          <a:ln w="12700" cap="flat">
+            <a:noFill/>
+            <a:miter lim="400000"/>
+          </a:ln>
+          <a:effectLst/>
+        </p:spPr>
+        <p:style>
+          <a:lnRef idx="0">
+            <a:scrgbClr r="0" g="0" b="0"/>
+          </a:lnRef>
+          <a:fillRef idx="0">
+            <a:scrgbClr r="0" g="0" b="0"/>
+          </a:fillRef>
+          <a:effectRef idx="0">
+            <a:scrgbClr r="0" g="0" b="0"/>
+          </a:effectRef>
+          <a:fontRef idx="none"/>
+        </p:style>
+        <p:txBody>
+          <a:bodyPr wrap="square">
+            <a:spAutoFit/>
+          </a:bodyPr>
+          <a:lstStyle/>
+          <a:p>
+            <a:pPr indent="457200"/>
+            <a:endParaRPr lang="en-US" sz="1200" dirty="0"/>
+          </a:p>
+          <a:p>
+            <a:pPr indent="457200">
+              <a:buFont typeface="+mj-lt"/>
+              <a:buAutoNum type="arabicParenR"/>
+            </a:pPr>
+            <a:r>
+              <a:rPr lang="en-US" sz="1200" b="0" i="0" dirty="0">
+                <a:solidFill>
+                  <a:srgbClr val="1A1A1A"/>
+                </a:solidFill>
+                <a:effectLst/>
+                <a:latin typeface="Noto Sans" panose="020B0502040204020203" pitchFamily="34" charset="0"/>
+              </a:rPr>
+              <a:t>Kalman, R. E. (March 1, 1960). "A New Approach to Linear Filtering and Prediction Problems."   ASME. </a:t>
+            </a:r>
+            <a:r>
+              <a:rPr lang="en-US" sz="1200" b="0" i="1" dirty="0">
+                <a:solidFill>
+                  <a:srgbClr val="1A1A1A"/>
+                </a:solidFill>
+                <a:effectLst/>
+                <a:latin typeface="Noto Sans" panose="020B0502040204020203" pitchFamily="34" charset="0"/>
+              </a:rPr>
+              <a:t>J. Basic Eng</a:t>
+            </a:r>
+            <a:r>
+              <a:rPr lang="en-US" sz="1200" b="0" i="0" dirty="0">
+                <a:solidFill>
+                  <a:srgbClr val="1A1A1A"/>
+                </a:solidFill>
+                <a:effectLst/>
+                <a:latin typeface="Noto Sans" panose="020B0502040204020203" pitchFamily="34" charset="0"/>
+              </a:rPr>
+              <a:t>. March 1960; 82(1): 35–	45. </a:t>
+            </a:r>
+            <a:r>
+              <a:rPr lang="en-US" sz="1200" b="0" i="0" u="none" strike="noStrike" dirty="0">
+                <a:solidFill>
+                  <a:srgbClr val="0D6C9F"/>
+                </a:solidFill>
+                <a:effectLst/>
+                <a:latin typeface="Noto Sans" panose="020B0502040204020203" pitchFamily="34" charset="0"/>
+                <a:hlinkClick r:id="rId2"/>
+              </a:rPr>
+              <a:t>https://doi.org/10.1115/1.3662552</a:t>
+            </a:r>
+            <a:endParaRPr lang="en-US" sz="1200" b="0" i="0" u="none" strike="noStrike" dirty="0">
+              <a:solidFill>
+                <a:srgbClr val="0D6C9F"/>
+              </a:solidFill>
+              <a:effectLst/>
+              <a:latin typeface="Noto Sans" panose="020B0502040204020203" pitchFamily="34" charset="0"/>
+            </a:endParaRPr>
+          </a:p>
+          <a:p>
+            <a:pPr indent="457200">
+              <a:buFont typeface="+mj-lt"/>
+              <a:buAutoNum type="arabicParenR"/>
+            </a:pPr>
+            <a:r>
+              <a:rPr lang="en-US" sz="1200" dirty="0"/>
+              <a:t>Blom, Henk. (1984). An efficient filter for abruptly changing systems. Proceedings of the 23rd IEEE Conference on Decision and Control. 656 - 658. 	10.1109/CDC.1984.272089. </a:t>
+            </a:r>
+          </a:p>
+          <a:p>
+            <a:pPr indent="457200"/>
+            <a:endParaRPr lang="en-US" sz="1200" dirty="0"/>
+          </a:p>
+        </p:txBody>
+      </p:sp>
     </p:spTree>
     <p:extLst>
       <p:ext uri="{BB962C8B-B14F-4D97-AF65-F5344CB8AC3E}">
@@ -21792,8 +21910,8 @@
           <a:chExt cx="0" cy="0"/>
         </a:xfrm>
       </p:grpSpPr>
-      <mc:AlternateContent xmlns:mc="http://schemas.openxmlformats.org/markup-compatibility/2006">
-        <mc:Choice xmlns:a14="http://schemas.microsoft.com/office/drawing/2010/main" Requires="a14">
+      <mc:AlternateContent xmlns:mc="http://schemas.openxmlformats.org/markup-compatibility/2006" xmlns:a14="http://schemas.microsoft.com/office/drawing/2010/main">
+        <mc:Choice Requires="a14">
           <p:sp>
             <p:nvSpPr>
               <p:cNvPr id="67" name="Text Placeholder 39">
@@ -22066,7 +22184,7 @@
             </p:txBody>
           </p:sp>
         </mc:Choice>
-        <mc:Fallback>
+        <mc:Fallback xmlns="">
           <p:sp>
             <p:nvSpPr>
               <p:cNvPr id="67" name="Text Placeholder 39">
@@ -23485,8 +23603,8 @@
           </a:p>
         </p:txBody>
       </p:sp>
-      <mc:AlternateContent xmlns:mc="http://schemas.openxmlformats.org/markup-compatibility/2006">
-        <mc:Choice xmlns:a14="http://schemas.microsoft.com/office/drawing/2010/main" Requires="a14">
+      <mc:AlternateContent xmlns:mc="http://schemas.openxmlformats.org/markup-compatibility/2006" xmlns:a14="http://schemas.microsoft.com/office/drawing/2010/main">
+        <mc:Choice Requires="a14">
           <p:sp>
             <p:nvSpPr>
               <p:cNvPr id="4" name="Text Placeholder 3">
@@ -23612,7 +23730,7 @@
             </p:txBody>
           </p:sp>
         </mc:Choice>
-        <mc:Fallback>
+        <mc:Fallback xmlns="">
           <p:sp>
             <p:nvSpPr>
               <p:cNvPr id="4" name="Text Placeholder 3">
@@ -23763,15 +23881,1229 @@
             <p:ph type="body" sz="quarter" idx="11"/>
           </p:nvPr>
         </p:nvSpPr>
-        <p:spPr/>
+        <p:spPr>
+          <a:xfrm>
+            <a:off x="135540" y="1341438"/>
+            <a:ext cx="6926831" cy="4911725"/>
+          </a:xfrm>
+        </p:spPr>
         <p:txBody>
-          <a:bodyPr/>
+          <a:bodyPr>
+            <a:normAutofit lnSpcReduction="10000"/>
+          </a:bodyPr>
           <a:lstStyle/>
           <a:p>
-            <a:endParaRPr lang="en-US"/>
+            <a:r>
+              <a:rPr lang="en-US" dirty="0"/>
+              <a:t>First developed in1958 by Rudolph Kálmán. [1]</a:t>
+            </a:r>
+          </a:p>
+          <a:p>
+            <a:r>
+              <a:rPr lang="en-US" dirty="0"/>
+              <a:t>The Kalman filter is an optimal filter for LTI systems that is applicable to many estimation and navigation practices.</a:t>
+            </a:r>
+          </a:p>
+          <a:p>
+            <a:r>
+              <a:rPr lang="en-US" dirty="0"/>
+              <a:t>Consists of two primary steps:</a:t>
+            </a:r>
+          </a:p>
+          <a:p>
+            <a:pPr lvl="1"/>
+            <a:r>
+              <a:rPr lang="en-US" dirty="0">
+                <a:solidFill>
+                  <a:srgbClr val="0005DA"/>
+                </a:solidFill>
+              </a:rPr>
+              <a:t>Time Update:</a:t>
+            </a:r>
+            <a:endParaRPr lang="en-US" dirty="0">
+              <a:solidFill>
+                <a:schemeClr val="accent5"/>
+              </a:solidFill>
+            </a:endParaRPr>
+          </a:p>
+          <a:p>
+            <a:pPr marL="892629" lvl="2" indent="0">
+              <a:buNone/>
+            </a:pPr>
+            <a:r>
+              <a:rPr lang="en-US" dirty="0">
+                <a:solidFill>
+                  <a:schemeClr val="accent5"/>
+                </a:solidFill>
+              </a:rPr>
+              <a:t>Model based propagation of all states, under known inputs.</a:t>
+            </a:r>
+            <a:endParaRPr lang="en-US" dirty="0">
+              <a:solidFill>
+                <a:srgbClr val="FF0000"/>
+              </a:solidFill>
+            </a:endParaRPr>
+          </a:p>
+          <a:p>
+            <a:pPr lvl="1"/>
+            <a:r>
+              <a:rPr lang="en-US" dirty="0">
+                <a:solidFill>
+                  <a:srgbClr val="FF0000"/>
+                </a:solidFill>
+              </a:rPr>
+              <a:t>Measurement Update:</a:t>
+            </a:r>
+          </a:p>
+          <a:p>
+            <a:pPr marL="892629" lvl="2" indent="0">
+              <a:buNone/>
+            </a:pPr>
+            <a:r>
+              <a:rPr lang="en-US" dirty="0">
+                <a:solidFill>
+                  <a:schemeClr val="accent5"/>
+                </a:solidFill>
+              </a:rPr>
+              <a:t>Measurement Correction of the propagated model states.</a:t>
+            </a:r>
+          </a:p>
+          <a:p>
+            <a:endParaRPr lang="en-US" dirty="0"/>
           </a:p>
         </p:txBody>
       </p:sp>
+      <mc:AlternateContent xmlns:mc="http://schemas.openxmlformats.org/markup-compatibility/2006">
+        <mc:Choice xmlns:a14="http://schemas.microsoft.com/office/drawing/2010/main" Requires="a14">
+          <p:sp>
+            <p:nvSpPr>
+              <p:cNvPr id="7" name="TextBox 6">
+                <a:extLst>
+                  <a:ext uri="{FF2B5EF4-FFF2-40B4-BE49-F238E27FC236}">
+                    <a16:creationId xmlns:a16="http://schemas.microsoft.com/office/drawing/2014/main" id="{F509D312-0A28-165B-71BA-B122719B8EF7}"/>
+                  </a:ext>
+                </a:extLst>
+              </p:cNvPr>
+              <p:cNvSpPr txBox="1"/>
+              <p:nvPr/>
+            </p:nvSpPr>
+            <p:spPr>
+              <a:xfrm>
+                <a:off x="7991229" y="4164732"/>
+                <a:ext cx="3195983" cy="1200329"/>
+              </a:xfrm>
+              <a:prstGeom prst="rect">
+                <a:avLst/>
+              </a:prstGeom>
+              <a:ln>
+                <a:solidFill>
+                  <a:srgbClr val="FF0000"/>
+                </a:solidFill>
+              </a:ln>
+            </p:spPr>
+            <p:style>
+              <a:lnRef idx="2">
+                <a:schemeClr val="dk1"/>
+              </a:lnRef>
+              <a:fillRef idx="1">
+                <a:schemeClr val="lt1"/>
+              </a:fillRef>
+              <a:effectRef idx="0">
+                <a:schemeClr val="dk1"/>
+              </a:effectRef>
+              <a:fontRef idx="minor">
+                <a:schemeClr val="dk1"/>
+              </a:fontRef>
+            </p:style>
+            <p:txBody>
+              <a:bodyPr wrap="square" rtlCol="0">
+                <a:spAutoFit/>
+              </a:bodyPr>
+              <a:lstStyle/>
+              <a:p>
+                <a:pPr algn="ctr"/>
+                <a:r>
+                  <a:rPr lang="en-US" dirty="0"/>
+                  <a:t>Measurement Update:</a:t>
+                </a:r>
+              </a:p>
+              <a:p>
+                <a:pPr algn="ctr"/>
+                <a14:m>
+                  <m:oMathPara xmlns:m="http://schemas.openxmlformats.org/officeDocument/2006/math">
+                    <m:oMathParaPr>
+                      <m:jc m:val="centerGroup"/>
+                    </m:oMathParaPr>
+                    <m:oMath xmlns:m="http://schemas.openxmlformats.org/officeDocument/2006/math">
+                      <m:sSub>
+                        <m:sSubPr>
+                          <m:ctrlPr>
+                            <a:rPr lang="en-US" b="0" i="1" smtClean="0">
+                              <a:latin typeface="Cambria Math" panose="02040503050406030204" pitchFamily="18" charset="0"/>
+                            </a:rPr>
+                          </m:ctrlPr>
+                        </m:sSubPr>
+                        <m:e>
+                          <m:r>
+                            <a:rPr lang="en-US" b="0" i="1" smtClean="0">
+                              <a:latin typeface="Cambria Math" panose="02040503050406030204" pitchFamily="18" charset="0"/>
+                            </a:rPr>
+                            <m:t>𝐾</m:t>
+                          </m:r>
+                        </m:e>
+                        <m:sub>
+                          <m:r>
+                            <a:rPr lang="en-US" b="0" i="1" smtClean="0">
+                              <a:latin typeface="Cambria Math" panose="02040503050406030204" pitchFamily="18" charset="0"/>
+                            </a:rPr>
+                            <m:t>𝑛</m:t>
+                          </m:r>
+                        </m:sub>
+                      </m:sSub>
+                      <m:r>
+                        <a:rPr lang="en-US" b="0" i="1" smtClean="0">
+                          <a:latin typeface="Cambria Math" panose="02040503050406030204" pitchFamily="18" charset="0"/>
+                        </a:rPr>
+                        <m:t>=</m:t>
+                      </m:r>
+                      <m:sSubSup>
+                        <m:sSubSupPr>
+                          <m:ctrlPr>
+                            <a:rPr lang="en-US" b="0" i="1" smtClean="0">
+                              <a:latin typeface="Cambria Math" panose="02040503050406030204" pitchFamily="18" charset="0"/>
+                            </a:rPr>
+                          </m:ctrlPr>
+                        </m:sSubSupPr>
+                        <m:e>
+                          <m:r>
+                            <a:rPr lang="en-US" b="0" i="1" smtClean="0">
+                              <a:latin typeface="Cambria Math" panose="02040503050406030204" pitchFamily="18" charset="0"/>
+                            </a:rPr>
+                            <m:t>𝑃</m:t>
+                          </m:r>
+                        </m:e>
+                        <m:sub>
+                          <m:r>
+                            <a:rPr lang="en-US" b="0" i="1" smtClean="0">
+                              <a:latin typeface="Cambria Math" panose="02040503050406030204" pitchFamily="18" charset="0"/>
+                            </a:rPr>
+                            <m:t>𝑛</m:t>
+                          </m:r>
+                        </m:sub>
+                        <m:sup>
+                          <m:r>
+                            <a:rPr lang="en-US" b="0" i="1" smtClean="0">
+                              <a:latin typeface="Cambria Math" panose="02040503050406030204" pitchFamily="18" charset="0"/>
+                            </a:rPr>
+                            <m:t>−</m:t>
+                          </m:r>
+                        </m:sup>
+                      </m:sSubSup>
+                      <m:sSup>
+                        <m:sSupPr>
+                          <m:ctrlPr>
+                            <a:rPr lang="en-US" b="0" i="1" smtClean="0">
+                              <a:latin typeface="Cambria Math" panose="02040503050406030204" pitchFamily="18" charset="0"/>
+                            </a:rPr>
+                          </m:ctrlPr>
+                        </m:sSupPr>
+                        <m:e>
+                          <m:r>
+                            <a:rPr lang="en-US" b="0" i="1" smtClean="0">
+                              <a:latin typeface="Cambria Math" panose="02040503050406030204" pitchFamily="18" charset="0"/>
+                            </a:rPr>
+                            <m:t>𝐻</m:t>
+                          </m:r>
+                        </m:e>
+                        <m:sup>
+                          <m:r>
+                            <a:rPr lang="en-US" b="0" i="1" smtClean="0">
+                              <a:latin typeface="Cambria Math" panose="02040503050406030204" pitchFamily="18" charset="0"/>
+                            </a:rPr>
+                            <m:t>𝑇</m:t>
+                          </m:r>
+                        </m:sup>
+                      </m:sSup>
+                      <m:sSup>
+                        <m:sSupPr>
+                          <m:ctrlPr>
+                            <a:rPr lang="en-US" b="0" i="1" smtClean="0">
+                              <a:latin typeface="Cambria Math" panose="02040503050406030204" pitchFamily="18" charset="0"/>
+                            </a:rPr>
+                          </m:ctrlPr>
+                        </m:sSupPr>
+                        <m:e>
+                          <m:d>
+                            <m:dPr>
+                              <m:ctrlPr>
+                                <a:rPr lang="en-US" b="0" i="1" smtClean="0">
+                                  <a:latin typeface="Cambria Math" panose="02040503050406030204" pitchFamily="18" charset="0"/>
+                                </a:rPr>
+                              </m:ctrlPr>
+                            </m:dPr>
+                            <m:e>
+                              <m:sSub>
+                                <m:sSubPr>
+                                  <m:ctrlPr>
+                                    <a:rPr lang="en-US" b="0" i="1" smtClean="0">
+                                      <a:latin typeface="Cambria Math" panose="02040503050406030204" pitchFamily="18" charset="0"/>
+                                    </a:rPr>
+                                  </m:ctrlPr>
+                                </m:sSubPr>
+                                <m:e>
+                                  <m:r>
+                                    <a:rPr lang="en-US" b="0" i="1" smtClean="0">
+                                      <a:latin typeface="Cambria Math" panose="02040503050406030204" pitchFamily="18" charset="0"/>
+                                    </a:rPr>
+                                    <m:t>𝐻</m:t>
+                                  </m:r>
+                                </m:e>
+                                <m:sub>
+                                  <m:r>
+                                    <a:rPr lang="en-US" b="0" i="1" smtClean="0">
+                                      <a:latin typeface="Cambria Math" panose="02040503050406030204" pitchFamily="18" charset="0"/>
+                                    </a:rPr>
+                                    <m:t>𝑛</m:t>
+                                  </m:r>
+                                </m:sub>
+                              </m:sSub>
+                              <m:sSubSup>
+                                <m:sSubSupPr>
+                                  <m:ctrlPr>
+                                    <a:rPr lang="en-US" b="0" i="1" smtClean="0">
+                                      <a:latin typeface="Cambria Math" panose="02040503050406030204" pitchFamily="18" charset="0"/>
+                                    </a:rPr>
+                                  </m:ctrlPr>
+                                </m:sSubSupPr>
+                                <m:e>
+                                  <m:r>
+                                    <a:rPr lang="en-US" b="0" i="1" smtClean="0">
+                                      <a:latin typeface="Cambria Math" panose="02040503050406030204" pitchFamily="18" charset="0"/>
+                                    </a:rPr>
+                                    <m:t>𝑃</m:t>
+                                  </m:r>
+                                </m:e>
+                                <m:sub>
+                                  <m:r>
+                                    <a:rPr lang="en-US" b="0" i="1" smtClean="0">
+                                      <a:latin typeface="Cambria Math" panose="02040503050406030204" pitchFamily="18" charset="0"/>
+                                    </a:rPr>
+                                    <m:t>𝑛</m:t>
+                                  </m:r>
+                                </m:sub>
+                                <m:sup>
+                                  <m:r>
+                                    <a:rPr lang="en-US" b="0" i="1" smtClean="0">
+                                      <a:latin typeface="Cambria Math" panose="02040503050406030204" pitchFamily="18" charset="0"/>
+                                    </a:rPr>
+                                    <m:t>−</m:t>
+                                  </m:r>
+                                </m:sup>
+                              </m:sSubSup>
+                              <m:sSup>
+                                <m:sSupPr>
+                                  <m:ctrlPr>
+                                    <a:rPr lang="en-US" b="0" i="1" smtClean="0">
+                                      <a:latin typeface="Cambria Math" panose="02040503050406030204" pitchFamily="18" charset="0"/>
+                                    </a:rPr>
+                                  </m:ctrlPr>
+                                </m:sSupPr>
+                                <m:e>
+                                  <m:r>
+                                    <a:rPr lang="en-US" b="0" i="1" smtClean="0">
+                                      <a:latin typeface="Cambria Math" panose="02040503050406030204" pitchFamily="18" charset="0"/>
+                                    </a:rPr>
+                                    <m:t>𝐻</m:t>
+                                  </m:r>
+                                </m:e>
+                                <m:sup>
+                                  <m:r>
+                                    <a:rPr lang="en-US" b="0" i="1" smtClean="0">
+                                      <a:latin typeface="Cambria Math" panose="02040503050406030204" pitchFamily="18" charset="0"/>
+                                    </a:rPr>
+                                    <m:t>𝑇</m:t>
+                                  </m:r>
+                                </m:sup>
+                              </m:sSup>
+                              <m:r>
+                                <a:rPr lang="en-US" b="0" i="1" smtClean="0">
+                                  <a:latin typeface="Cambria Math" panose="02040503050406030204" pitchFamily="18" charset="0"/>
+                                </a:rPr>
+                                <m:t>+</m:t>
+                              </m:r>
+                              <m:sSub>
+                                <m:sSubPr>
+                                  <m:ctrlPr>
+                                    <a:rPr lang="en-US" b="0" i="1" smtClean="0">
+                                      <a:latin typeface="Cambria Math" panose="02040503050406030204" pitchFamily="18" charset="0"/>
+                                    </a:rPr>
+                                  </m:ctrlPr>
+                                </m:sSubPr>
+                                <m:e>
+                                  <m:r>
+                                    <a:rPr lang="en-US" b="0" i="1" smtClean="0">
+                                      <a:latin typeface="Cambria Math" panose="02040503050406030204" pitchFamily="18" charset="0"/>
+                                    </a:rPr>
+                                    <m:t>𝑅</m:t>
+                                  </m:r>
+                                </m:e>
+                                <m:sub>
+                                  <m:r>
+                                    <a:rPr lang="en-US" b="0" i="1" smtClean="0">
+                                      <a:latin typeface="Cambria Math" panose="02040503050406030204" pitchFamily="18" charset="0"/>
+                                    </a:rPr>
+                                    <m:t>𝑛</m:t>
+                                  </m:r>
+                                </m:sub>
+                              </m:sSub>
+                            </m:e>
+                          </m:d>
+                        </m:e>
+                        <m:sup>
+                          <m:r>
+                            <a:rPr lang="en-US" b="0" i="1" smtClean="0">
+                              <a:latin typeface="Cambria Math" panose="02040503050406030204" pitchFamily="18" charset="0"/>
+                            </a:rPr>
+                            <m:t>−1</m:t>
+                          </m:r>
+                        </m:sup>
+                      </m:sSup>
+                    </m:oMath>
+                  </m:oMathPara>
+                </a14:m>
+                <a:endParaRPr lang="en-US" dirty="0"/>
+              </a:p>
+              <a:p>
+                <a:pPr algn="ctr"/>
+                <a14:m>
+                  <m:oMathPara xmlns:m="http://schemas.openxmlformats.org/officeDocument/2006/math">
+                    <m:oMathParaPr>
+                      <m:jc m:val="centerGroup"/>
+                    </m:oMathParaPr>
+                    <m:oMath xmlns:m="http://schemas.openxmlformats.org/officeDocument/2006/math">
+                      <m:sSubSup>
+                        <m:sSubSupPr>
+                          <m:ctrlPr>
+                            <a:rPr lang="en-US" b="0" i="1" smtClean="0">
+                              <a:latin typeface="Cambria Math" panose="02040503050406030204" pitchFamily="18" charset="0"/>
+                            </a:rPr>
+                          </m:ctrlPr>
+                        </m:sSubSupPr>
+                        <m:e>
+                          <m:r>
+                            <a:rPr lang="en-US" b="0" i="1" smtClean="0">
+                              <a:latin typeface="Cambria Math" panose="02040503050406030204" pitchFamily="18" charset="0"/>
+                            </a:rPr>
+                            <m:t>𝑥</m:t>
+                          </m:r>
+                        </m:e>
+                        <m:sub>
+                          <m:r>
+                            <a:rPr lang="en-US" b="0" i="1" smtClean="0">
+                              <a:latin typeface="Cambria Math" panose="02040503050406030204" pitchFamily="18" charset="0"/>
+                            </a:rPr>
+                            <m:t>𝑛</m:t>
+                          </m:r>
+                        </m:sub>
+                        <m:sup>
+                          <m:r>
+                            <a:rPr lang="en-US" b="0" i="1" smtClean="0">
+                              <a:latin typeface="Cambria Math" panose="02040503050406030204" pitchFamily="18" charset="0"/>
+                            </a:rPr>
+                            <m:t>+</m:t>
+                          </m:r>
+                        </m:sup>
+                      </m:sSubSup>
+                      <m:r>
+                        <a:rPr lang="en-US" b="0" i="1" smtClean="0">
+                          <a:latin typeface="Cambria Math" panose="02040503050406030204" pitchFamily="18" charset="0"/>
+                        </a:rPr>
+                        <m:t>=</m:t>
+                      </m:r>
+                      <m:sSubSup>
+                        <m:sSubSupPr>
+                          <m:ctrlPr>
+                            <a:rPr lang="en-US" b="0" i="1" smtClean="0">
+                              <a:latin typeface="Cambria Math" panose="02040503050406030204" pitchFamily="18" charset="0"/>
+                            </a:rPr>
+                          </m:ctrlPr>
+                        </m:sSubSupPr>
+                        <m:e>
+                          <m:r>
+                            <a:rPr lang="en-US" b="0" i="1" smtClean="0">
+                              <a:latin typeface="Cambria Math" panose="02040503050406030204" pitchFamily="18" charset="0"/>
+                            </a:rPr>
+                            <m:t>𝑥</m:t>
+                          </m:r>
+                        </m:e>
+                        <m:sub>
+                          <m:r>
+                            <a:rPr lang="en-US" b="0" i="1" smtClean="0">
+                              <a:latin typeface="Cambria Math" panose="02040503050406030204" pitchFamily="18" charset="0"/>
+                            </a:rPr>
+                            <m:t>𝑛</m:t>
+                          </m:r>
+                        </m:sub>
+                        <m:sup>
+                          <m:r>
+                            <a:rPr lang="en-US" b="0" i="1" smtClean="0">
+                              <a:latin typeface="Cambria Math" panose="02040503050406030204" pitchFamily="18" charset="0"/>
+                            </a:rPr>
+                            <m:t>−</m:t>
+                          </m:r>
+                        </m:sup>
+                      </m:sSubSup>
+                      <m:r>
+                        <a:rPr lang="en-US" b="0" i="1" smtClean="0">
+                          <a:latin typeface="Cambria Math" panose="02040503050406030204" pitchFamily="18" charset="0"/>
+                        </a:rPr>
+                        <m:t>+</m:t>
+                      </m:r>
+                      <m:sSub>
+                        <m:sSubPr>
+                          <m:ctrlPr>
+                            <a:rPr lang="en-US" b="0" i="1" smtClean="0">
+                              <a:latin typeface="Cambria Math" panose="02040503050406030204" pitchFamily="18" charset="0"/>
+                            </a:rPr>
+                          </m:ctrlPr>
+                        </m:sSubPr>
+                        <m:e>
+                          <m:r>
+                            <a:rPr lang="en-US" b="0" i="1" smtClean="0">
+                              <a:latin typeface="Cambria Math" panose="02040503050406030204" pitchFamily="18" charset="0"/>
+                            </a:rPr>
+                            <m:t>𝐾</m:t>
+                          </m:r>
+                        </m:e>
+                        <m:sub>
+                          <m:r>
+                            <a:rPr lang="en-US" b="0" i="1" smtClean="0">
+                              <a:latin typeface="Cambria Math" panose="02040503050406030204" pitchFamily="18" charset="0"/>
+                            </a:rPr>
+                            <m:t>𝑛</m:t>
+                          </m:r>
+                        </m:sub>
+                      </m:sSub>
+                      <m:r>
+                        <a:rPr lang="en-US" b="0" i="1" smtClean="0">
+                          <a:latin typeface="Cambria Math" panose="02040503050406030204" pitchFamily="18" charset="0"/>
+                        </a:rPr>
+                        <m:t>(</m:t>
+                      </m:r>
+                      <m:sSub>
+                        <m:sSubPr>
+                          <m:ctrlPr>
+                            <a:rPr lang="en-US" b="0" i="1" smtClean="0">
+                              <a:latin typeface="Cambria Math" panose="02040503050406030204" pitchFamily="18" charset="0"/>
+                            </a:rPr>
+                          </m:ctrlPr>
+                        </m:sSubPr>
+                        <m:e>
+                          <m:r>
+                            <a:rPr lang="en-US" b="0" i="1" smtClean="0">
+                              <a:latin typeface="Cambria Math" panose="02040503050406030204" pitchFamily="18" charset="0"/>
+                            </a:rPr>
+                            <m:t>𝑧</m:t>
+                          </m:r>
+                        </m:e>
+                        <m:sub>
+                          <m:r>
+                            <a:rPr lang="en-US" b="0" i="1" smtClean="0">
+                              <a:latin typeface="Cambria Math" panose="02040503050406030204" pitchFamily="18" charset="0"/>
+                            </a:rPr>
+                            <m:t>𝑛</m:t>
+                          </m:r>
+                        </m:sub>
+                      </m:sSub>
+                      <m:r>
+                        <a:rPr lang="en-US" b="0" i="1" smtClean="0">
+                          <a:latin typeface="Cambria Math" panose="02040503050406030204" pitchFamily="18" charset="0"/>
+                        </a:rPr>
+                        <m:t>−</m:t>
+                      </m:r>
+                      <m:sSub>
+                        <m:sSubPr>
+                          <m:ctrlPr>
+                            <a:rPr lang="en-US" b="0" i="1" smtClean="0">
+                              <a:latin typeface="Cambria Math" panose="02040503050406030204" pitchFamily="18" charset="0"/>
+                            </a:rPr>
+                          </m:ctrlPr>
+                        </m:sSubPr>
+                        <m:e>
+                          <m:r>
+                            <a:rPr lang="en-US" b="0" i="1" smtClean="0">
+                              <a:latin typeface="Cambria Math" panose="02040503050406030204" pitchFamily="18" charset="0"/>
+                            </a:rPr>
+                            <m:t>𝐻</m:t>
+                          </m:r>
+                        </m:e>
+                        <m:sub>
+                          <m:r>
+                            <a:rPr lang="en-US" b="0" i="1" smtClean="0">
+                              <a:latin typeface="Cambria Math" panose="02040503050406030204" pitchFamily="18" charset="0"/>
+                            </a:rPr>
+                            <m:t>𝑛</m:t>
+                          </m:r>
+                        </m:sub>
+                      </m:sSub>
+                      <m:sSubSup>
+                        <m:sSubSupPr>
+                          <m:ctrlPr>
+                            <a:rPr lang="en-US" b="0" i="1" smtClean="0">
+                              <a:latin typeface="Cambria Math" panose="02040503050406030204" pitchFamily="18" charset="0"/>
+                            </a:rPr>
+                          </m:ctrlPr>
+                        </m:sSubSupPr>
+                        <m:e>
+                          <m:r>
+                            <a:rPr lang="en-US" b="0" i="1" smtClean="0">
+                              <a:latin typeface="Cambria Math" panose="02040503050406030204" pitchFamily="18" charset="0"/>
+                            </a:rPr>
+                            <m:t>𝑥</m:t>
+                          </m:r>
+                        </m:e>
+                        <m:sub>
+                          <m:r>
+                            <a:rPr lang="en-US" b="0" i="1" smtClean="0">
+                              <a:latin typeface="Cambria Math" panose="02040503050406030204" pitchFamily="18" charset="0"/>
+                            </a:rPr>
+                            <m:t>𝑛</m:t>
+                          </m:r>
+                        </m:sub>
+                        <m:sup>
+                          <m:r>
+                            <a:rPr lang="en-US" b="0" i="1" smtClean="0">
+                              <a:latin typeface="Cambria Math" panose="02040503050406030204" pitchFamily="18" charset="0"/>
+                            </a:rPr>
+                            <m:t>−</m:t>
+                          </m:r>
+                        </m:sup>
+                      </m:sSubSup>
+                      <m:r>
+                        <a:rPr lang="en-US" b="0" i="1" smtClean="0">
+                          <a:latin typeface="Cambria Math" panose="02040503050406030204" pitchFamily="18" charset="0"/>
+                        </a:rPr>
+                        <m:t>)</m:t>
+                      </m:r>
+                    </m:oMath>
+                  </m:oMathPara>
+                </a14:m>
+                <a:endParaRPr lang="en-US" dirty="0"/>
+              </a:p>
+              <a:p>
+                <a:pPr algn="ctr"/>
+                <a14:m>
+                  <m:oMath xmlns:m="http://schemas.openxmlformats.org/officeDocument/2006/math">
+                    <m:sSubSup>
+                      <m:sSubSupPr>
+                        <m:ctrlPr>
+                          <a:rPr lang="en-US" b="0" i="1" smtClean="0">
+                            <a:latin typeface="Cambria Math" panose="02040503050406030204" pitchFamily="18" charset="0"/>
+                          </a:rPr>
+                        </m:ctrlPr>
+                      </m:sSubSupPr>
+                      <m:e>
+                        <m:r>
+                          <a:rPr lang="en-US" b="0" i="1" smtClean="0">
+                            <a:latin typeface="Cambria Math" panose="02040503050406030204" pitchFamily="18" charset="0"/>
+                          </a:rPr>
+                          <m:t>𝑃</m:t>
+                        </m:r>
+                      </m:e>
+                      <m:sub>
+                        <m:r>
+                          <a:rPr lang="en-US" b="0" i="1" smtClean="0">
+                            <a:latin typeface="Cambria Math" panose="02040503050406030204" pitchFamily="18" charset="0"/>
+                          </a:rPr>
+                          <m:t>𝑛</m:t>
+                        </m:r>
+                      </m:sub>
+                      <m:sup>
+                        <m:r>
+                          <a:rPr lang="en-US" b="0" i="1" smtClean="0">
+                            <a:latin typeface="Cambria Math" panose="02040503050406030204" pitchFamily="18" charset="0"/>
+                          </a:rPr>
+                          <m:t>+</m:t>
+                        </m:r>
+                      </m:sup>
+                    </m:sSubSup>
+                    <m:r>
+                      <a:rPr lang="en-US" b="0" i="1" smtClean="0">
+                        <a:latin typeface="Cambria Math" panose="02040503050406030204" pitchFamily="18" charset="0"/>
+                      </a:rPr>
+                      <m:t>=</m:t>
+                    </m:r>
+                    <m:d>
+                      <m:dPr>
+                        <m:ctrlPr>
+                          <a:rPr lang="en-US" b="0" i="1" smtClean="0">
+                            <a:latin typeface="Cambria Math" panose="02040503050406030204" pitchFamily="18" charset="0"/>
+                          </a:rPr>
+                        </m:ctrlPr>
+                      </m:dPr>
+                      <m:e>
+                        <m:r>
+                          <a:rPr lang="en-US" b="0" i="1" smtClean="0">
+                            <a:latin typeface="Cambria Math" panose="02040503050406030204" pitchFamily="18" charset="0"/>
+                          </a:rPr>
+                          <m:t>𝐼</m:t>
+                        </m:r>
+                        <m:r>
+                          <a:rPr lang="en-US" b="0" i="1" smtClean="0">
+                            <a:latin typeface="Cambria Math" panose="02040503050406030204" pitchFamily="18" charset="0"/>
+                          </a:rPr>
+                          <m:t>−</m:t>
+                        </m:r>
+                        <m:sSub>
+                          <m:sSubPr>
+                            <m:ctrlPr>
+                              <a:rPr lang="en-US" b="0" i="1" smtClean="0">
+                                <a:latin typeface="Cambria Math" panose="02040503050406030204" pitchFamily="18" charset="0"/>
+                              </a:rPr>
+                            </m:ctrlPr>
+                          </m:sSubPr>
+                          <m:e>
+                            <m:r>
+                              <a:rPr lang="en-US" b="0" i="1" smtClean="0">
+                                <a:latin typeface="Cambria Math" panose="02040503050406030204" pitchFamily="18" charset="0"/>
+                              </a:rPr>
+                              <m:t>𝐾</m:t>
+                            </m:r>
+                          </m:e>
+                          <m:sub>
+                            <m:r>
+                              <a:rPr lang="en-US" b="0" i="1" smtClean="0">
+                                <a:latin typeface="Cambria Math" panose="02040503050406030204" pitchFamily="18" charset="0"/>
+                              </a:rPr>
+                              <m:t>𝑛</m:t>
+                            </m:r>
+                          </m:sub>
+                        </m:sSub>
+                        <m:sSub>
+                          <m:sSubPr>
+                            <m:ctrlPr>
+                              <a:rPr lang="en-US" b="0" i="1" smtClean="0">
+                                <a:latin typeface="Cambria Math" panose="02040503050406030204" pitchFamily="18" charset="0"/>
+                              </a:rPr>
+                            </m:ctrlPr>
+                          </m:sSubPr>
+                          <m:e>
+                            <m:r>
+                              <a:rPr lang="en-US" b="0" i="1" smtClean="0">
+                                <a:latin typeface="Cambria Math" panose="02040503050406030204" pitchFamily="18" charset="0"/>
+                              </a:rPr>
+                              <m:t>𝐻</m:t>
+                            </m:r>
+                          </m:e>
+                          <m:sub>
+                            <m:r>
+                              <a:rPr lang="en-US" b="0" i="1" smtClean="0">
+                                <a:latin typeface="Cambria Math" panose="02040503050406030204" pitchFamily="18" charset="0"/>
+                              </a:rPr>
+                              <m:t>𝑛</m:t>
+                            </m:r>
+                          </m:sub>
+                        </m:sSub>
+                      </m:e>
+                    </m:d>
+                    <m:sSubSup>
+                      <m:sSubSupPr>
+                        <m:ctrlPr>
+                          <a:rPr lang="en-US" b="0" i="1" smtClean="0">
+                            <a:latin typeface="Cambria Math" panose="02040503050406030204" pitchFamily="18" charset="0"/>
+                          </a:rPr>
+                        </m:ctrlPr>
+                      </m:sSubSupPr>
+                      <m:e>
+                        <m:r>
+                          <a:rPr lang="en-US" b="0" i="1" smtClean="0">
+                            <a:latin typeface="Cambria Math" panose="02040503050406030204" pitchFamily="18" charset="0"/>
+                          </a:rPr>
+                          <m:t>𝑃</m:t>
+                        </m:r>
+                      </m:e>
+                      <m:sub>
+                        <m:r>
+                          <a:rPr lang="en-US" b="0" i="1" smtClean="0">
+                            <a:latin typeface="Cambria Math" panose="02040503050406030204" pitchFamily="18" charset="0"/>
+                          </a:rPr>
+                          <m:t>𝑛</m:t>
+                        </m:r>
+                      </m:sub>
+                      <m:sup>
+                        <m:r>
+                          <a:rPr lang="en-US" b="0" i="1" smtClean="0">
+                            <a:latin typeface="Cambria Math" panose="02040503050406030204" pitchFamily="18" charset="0"/>
+                          </a:rPr>
+                          <m:t>−</m:t>
+                        </m:r>
+                      </m:sup>
+                    </m:sSubSup>
+                  </m:oMath>
+                </a14:m>
+                <a:r>
+                  <a:rPr lang="en-US" b="0" dirty="0"/>
+                  <a:t> </a:t>
+                </a:r>
+              </a:p>
+            </p:txBody>
+          </p:sp>
+        </mc:Choice>
+        <mc:Fallback>
+          <p:sp>
+            <p:nvSpPr>
+              <p:cNvPr id="7" name="TextBox 6">
+                <a:extLst>
+                  <a:ext uri="{FF2B5EF4-FFF2-40B4-BE49-F238E27FC236}">
+                    <a16:creationId xmlns:a16="http://schemas.microsoft.com/office/drawing/2014/main" id="{F509D312-0A28-165B-71BA-B122719B8EF7}"/>
+                  </a:ext>
+                </a:extLst>
+              </p:cNvPr>
+              <p:cNvSpPr txBox="1">
+                <a:spLocks noRot="1" noChangeAspect="1" noMove="1" noResize="1" noEditPoints="1" noAdjustHandles="1" noChangeArrowheads="1" noChangeShapeType="1" noTextEdit="1"/>
+              </p:cNvSpPr>
+              <p:nvPr/>
+            </p:nvSpPr>
+            <p:spPr>
+              <a:xfrm>
+                <a:off x="7991229" y="4164732"/>
+                <a:ext cx="3195983" cy="1200329"/>
+              </a:xfrm>
+              <a:prstGeom prst="rect">
+                <a:avLst/>
+              </a:prstGeom>
+              <a:blipFill>
+                <a:blip r:embed="rId2"/>
+                <a:stretch>
+                  <a:fillRect t="-1493"/>
+                </a:stretch>
+              </a:blipFill>
+              <a:ln>
+                <a:solidFill>
+                  <a:srgbClr val="FF0000"/>
+                </a:solidFill>
+              </a:ln>
+            </p:spPr>
+            <p:txBody>
+              <a:bodyPr/>
+              <a:lstStyle/>
+              <a:p>
+                <a:r>
+                  <a:rPr lang="en-US">
+                    <a:noFill/>
+                  </a:rPr>
+                  <a:t> </a:t>
+                </a:r>
+              </a:p>
+            </p:txBody>
+          </p:sp>
+        </mc:Fallback>
+      </mc:AlternateContent>
+      <mc:AlternateContent xmlns:mc="http://schemas.openxmlformats.org/markup-compatibility/2006">
+        <mc:Choice xmlns:a14="http://schemas.microsoft.com/office/drawing/2010/main" Requires="a14">
+          <p:sp>
+            <p:nvSpPr>
+              <p:cNvPr id="8" name="TextBox 7">
+                <a:extLst>
+                  <a:ext uri="{FF2B5EF4-FFF2-40B4-BE49-F238E27FC236}">
+                    <a16:creationId xmlns:a16="http://schemas.microsoft.com/office/drawing/2014/main" id="{E325CD23-079E-BE31-1035-E36AB3D051CB}"/>
+                  </a:ext>
+                </a:extLst>
+              </p:cNvPr>
+              <p:cNvSpPr txBox="1"/>
+              <p:nvPr/>
+            </p:nvSpPr>
+            <p:spPr>
+              <a:xfrm>
+                <a:off x="7895017" y="2293689"/>
+                <a:ext cx="3195983" cy="946991"/>
+              </a:xfrm>
+              <a:prstGeom prst="rect">
+                <a:avLst/>
+              </a:prstGeom>
+              <a:ln>
+                <a:solidFill>
+                  <a:srgbClr val="0005DA"/>
+                </a:solidFill>
+              </a:ln>
+            </p:spPr>
+            <p:style>
+              <a:lnRef idx="2">
+                <a:schemeClr val="accent3"/>
+              </a:lnRef>
+              <a:fillRef idx="1">
+                <a:schemeClr val="lt1"/>
+              </a:fillRef>
+              <a:effectRef idx="0">
+                <a:schemeClr val="accent3"/>
+              </a:effectRef>
+              <a:fontRef idx="minor">
+                <a:schemeClr val="dk1"/>
+              </a:fontRef>
+            </p:style>
+            <p:txBody>
+              <a:bodyPr wrap="square" rtlCol="0">
+                <a:spAutoFit/>
+              </a:bodyPr>
+              <a:lstStyle/>
+              <a:p>
+                <a:pPr algn="ctr"/>
+                <a:r>
+                  <a:rPr lang="en-US" dirty="0"/>
+                  <a:t>Time Update:</a:t>
+                </a:r>
+              </a:p>
+              <a:p>
+                <a:pPr algn="ctr"/>
+                <a14:m>
+                  <m:oMathPara xmlns:m="http://schemas.openxmlformats.org/officeDocument/2006/math">
+                    <m:oMathParaPr>
+                      <m:jc m:val="centerGroup"/>
+                    </m:oMathParaPr>
+                    <m:oMath xmlns:m="http://schemas.openxmlformats.org/officeDocument/2006/math">
+                      <m:sSubSup>
+                        <m:sSubSupPr>
+                          <m:ctrlPr>
+                            <a:rPr lang="en-US" b="0" i="1" smtClean="0">
+                              <a:latin typeface="Cambria Math" panose="02040503050406030204" pitchFamily="18" charset="0"/>
+                            </a:rPr>
+                          </m:ctrlPr>
+                        </m:sSubSupPr>
+                        <m:e>
+                          <m:r>
+                            <a:rPr lang="en-US" b="0" i="1" smtClean="0">
+                              <a:latin typeface="Cambria Math" panose="02040503050406030204" pitchFamily="18" charset="0"/>
+                            </a:rPr>
+                            <m:t>𝑥</m:t>
+                          </m:r>
+                        </m:e>
+                        <m:sub>
+                          <m:r>
+                            <a:rPr lang="en-US" b="0" i="1" smtClean="0">
+                              <a:latin typeface="Cambria Math" panose="02040503050406030204" pitchFamily="18" charset="0"/>
+                            </a:rPr>
+                            <m:t>𝑛</m:t>
+                          </m:r>
+                          <m:r>
+                            <a:rPr lang="en-US" b="0" i="1" smtClean="0">
+                              <a:latin typeface="Cambria Math" panose="02040503050406030204" pitchFamily="18" charset="0"/>
+                            </a:rPr>
+                            <m:t>+1</m:t>
+                          </m:r>
+                        </m:sub>
+                        <m:sup>
+                          <m:r>
+                            <a:rPr lang="en-US" b="0" i="1" smtClean="0">
+                              <a:latin typeface="Cambria Math" panose="02040503050406030204" pitchFamily="18" charset="0"/>
+                            </a:rPr>
+                            <m:t>−</m:t>
+                          </m:r>
+                        </m:sup>
+                      </m:sSubSup>
+                      <m:r>
+                        <a:rPr lang="en-US" b="0" i="1" smtClean="0">
+                          <a:latin typeface="Cambria Math" panose="02040503050406030204" pitchFamily="18" charset="0"/>
+                        </a:rPr>
+                        <m:t>=</m:t>
+                      </m:r>
+                      <m:r>
+                        <a:rPr lang="en-US" b="0" i="1" smtClean="0">
+                          <a:latin typeface="Cambria Math" panose="02040503050406030204" pitchFamily="18" charset="0"/>
+                        </a:rPr>
+                        <m:t>𝐴</m:t>
+                      </m:r>
+                      <m:sSub>
+                        <m:sSubPr>
+                          <m:ctrlPr>
+                            <a:rPr lang="en-US" b="0" i="1" smtClean="0">
+                              <a:latin typeface="Cambria Math" panose="02040503050406030204" pitchFamily="18" charset="0"/>
+                            </a:rPr>
+                          </m:ctrlPr>
+                        </m:sSubPr>
+                        <m:e>
+                          <m:r>
+                            <a:rPr lang="en-US" b="0" i="1" smtClean="0">
+                              <a:latin typeface="Cambria Math" panose="02040503050406030204" pitchFamily="18" charset="0"/>
+                            </a:rPr>
+                            <m:t>𝑥</m:t>
+                          </m:r>
+                        </m:e>
+                        <m:sub>
+                          <m:r>
+                            <a:rPr lang="en-US" b="0" i="1" smtClean="0">
+                              <a:latin typeface="Cambria Math" panose="02040503050406030204" pitchFamily="18" charset="0"/>
+                            </a:rPr>
+                            <m:t>𝑛</m:t>
+                          </m:r>
+                        </m:sub>
+                      </m:sSub>
+                      <m:r>
+                        <a:rPr lang="en-US" b="0" i="1" smtClean="0">
+                          <a:latin typeface="Cambria Math" panose="02040503050406030204" pitchFamily="18" charset="0"/>
+                        </a:rPr>
+                        <m:t> </m:t>
+                      </m:r>
+                    </m:oMath>
+                  </m:oMathPara>
+                </a14:m>
+                <a:endParaRPr lang="en-US" b="0" dirty="0"/>
+              </a:p>
+              <a:p>
+                <a:pPr algn="ctr"/>
+                <a:r>
+                  <a:rPr lang="en-US" b="0" dirty="0"/>
+                  <a:t> </a:t>
+                </a:r>
+                <a14:m>
+                  <m:oMath xmlns:m="http://schemas.openxmlformats.org/officeDocument/2006/math">
+                    <m:sSubSup>
+                      <m:sSubSupPr>
+                        <m:ctrlPr>
+                          <a:rPr lang="en-US" b="0" i="1" smtClean="0">
+                            <a:latin typeface="Cambria Math" panose="02040503050406030204" pitchFamily="18" charset="0"/>
+                          </a:rPr>
+                        </m:ctrlPr>
+                      </m:sSubSupPr>
+                      <m:e>
+                        <m:r>
+                          <a:rPr lang="en-US" b="0" i="1" smtClean="0">
+                            <a:latin typeface="Cambria Math" panose="02040503050406030204" pitchFamily="18" charset="0"/>
+                          </a:rPr>
+                          <m:t>𝑃</m:t>
+                        </m:r>
+                      </m:e>
+                      <m:sub>
+                        <m:r>
+                          <a:rPr lang="en-US" b="0" i="1" smtClean="0">
+                            <a:latin typeface="Cambria Math" panose="02040503050406030204" pitchFamily="18" charset="0"/>
+                          </a:rPr>
+                          <m:t>𝑛</m:t>
+                        </m:r>
+                        <m:r>
+                          <a:rPr lang="en-US" b="0" i="1" smtClean="0">
+                            <a:latin typeface="Cambria Math" panose="02040503050406030204" pitchFamily="18" charset="0"/>
+                          </a:rPr>
+                          <m:t>+1</m:t>
+                        </m:r>
+                      </m:sub>
+                      <m:sup>
+                        <m:r>
+                          <a:rPr lang="en-US" b="0" i="1" smtClean="0">
+                            <a:latin typeface="Cambria Math" panose="02040503050406030204" pitchFamily="18" charset="0"/>
+                          </a:rPr>
+                          <m:t>−</m:t>
+                        </m:r>
+                      </m:sup>
+                    </m:sSubSup>
+                    <m:r>
+                      <a:rPr lang="en-US" b="0" i="1" smtClean="0">
+                        <a:latin typeface="Cambria Math" panose="02040503050406030204" pitchFamily="18" charset="0"/>
+                      </a:rPr>
+                      <m:t>=</m:t>
+                    </m:r>
+                    <m:r>
+                      <a:rPr lang="en-US" b="0" i="1" smtClean="0">
+                        <a:latin typeface="Cambria Math" panose="02040503050406030204" pitchFamily="18" charset="0"/>
+                      </a:rPr>
+                      <m:t>𝐴</m:t>
+                    </m:r>
+                    <m:sSub>
+                      <m:sSubPr>
+                        <m:ctrlPr>
+                          <a:rPr lang="en-US" b="0" i="1" smtClean="0">
+                            <a:latin typeface="Cambria Math" panose="02040503050406030204" pitchFamily="18" charset="0"/>
+                          </a:rPr>
+                        </m:ctrlPr>
+                      </m:sSubPr>
+                      <m:e>
+                        <m:r>
+                          <a:rPr lang="en-US" b="0" i="1" smtClean="0">
+                            <a:latin typeface="Cambria Math" panose="02040503050406030204" pitchFamily="18" charset="0"/>
+                          </a:rPr>
+                          <m:t>𝑃</m:t>
+                        </m:r>
+                      </m:e>
+                      <m:sub>
+                        <m:r>
+                          <a:rPr lang="en-US" b="0" i="1" smtClean="0">
+                            <a:latin typeface="Cambria Math" panose="02040503050406030204" pitchFamily="18" charset="0"/>
+                          </a:rPr>
+                          <m:t>𝑛</m:t>
+                        </m:r>
+                      </m:sub>
+                    </m:sSub>
+                    <m:sSup>
+                      <m:sSupPr>
+                        <m:ctrlPr>
+                          <a:rPr lang="en-US" b="0" i="1" smtClean="0">
+                            <a:latin typeface="Cambria Math" panose="02040503050406030204" pitchFamily="18" charset="0"/>
+                          </a:rPr>
+                        </m:ctrlPr>
+                      </m:sSupPr>
+                      <m:e>
+                        <m:r>
+                          <a:rPr lang="en-US" b="0" i="1" smtClean="0">
+                            <a:latin typeface="Cambria Math" panose="02040503050406030204" pitchFamily="18" charset="0"/>
+                          </a:rPr>
+                          <m:t>𝐴</m:t>
+                        </m:r>
+                      </m:e>
+                      <m:sup>
+                        <m:r>
+                          <a:rPr lang="en-US" b="0" i="1" smtClean="0">
+                            <a:latin typeface="Cambria Math" panose="02040503050406030204" pitchFamily="18" charset="0"/>
+                          </a:rPr>
+                          <m:t>𝑇</m:t>
+                        </m:r>
+                      </m:sup>
+                    </m:sSup>
+                  </m:oMath>
+                </a14:m>
+                <a:endParaRPr lang="en-US" b="0" dirty="0"/>
+              </a:p>
+            </p:txBody>
+          </p:sp>
+        </mc:Choice>
+        <mc:Fallback>
+          <p:sp>
+            <p:nvSpPr>
+              <p:cNvPr id="8" name="TextBox 7">
+                <a:extLst>
+                  <a:ext uri="{FF2B5EF4-FFF2-40B4-BE49-F238E27FC236}">
+                    <a16:creationId xmlns:a16="http://schemas.microsoft.com/office/drawing/2014/main" id="{E325CD23-079E-BE31-1035-E36AB3D051CB}"/>
+                  </a:ext>
+                </a:extLst>
+              </p:cNvPr>
+              <p:cNvSpPr txBox="1">
+                <a:spLocks noRot="1" noChangeAspect="1" noMove="1" noResize="1" noEditPoints="1" noAdjustHandles="1" noChangeArrowheads="1" noChangeShapeType="1" noTextEdit="1"/>
+              </p:cNvSpPr>
+              <p:nvPr/>
+            </p:nvSpPr>
+            <p:spPr>
+              <a:xfrm>
+                <a:off x="7895017" y="2293689"/>
+                <a:ext cx="3195983" cy="946991"/>
+              </a:xfrm>
+              <a:prstGeom prst="rect">
+                <a:avLst/>
+              </a:prstGeom>
+              <a:blipFill>
+                <a:blip r:embed="rId3"/>
+                <a:stretch>
+                  <a:fillRect t="-1875"/>
+                </a:stretch>
+              </a:blipFill>
+              <a:ln>
+                <a:solidFill>
+                  <a:srgbClr val="0005DA"/>
+                </a:solidFill>
+              </a:ln>
+            </p:spPr>
+            <p:txBody>
+              <a:bodyPr/>
+              <a:lstStyle/>
+              <a:p>
+                <a:r>
+                  <a:rPr lang="en-US">
+                    <a:noFill/>
+                  </a:rPr>
+                  <a:t> </a:t>
+                </a:r>
+              </a:p>
+            </p:txBody>
+          </p:sp>
+        </mc:Fallback>
+      </mc:AlternateContent>
+      <p:cxnSp>
+        <p:nvCxnSpPr>
+          <p:cNvPr id="9" name="Connector: Curved 8">
+            <a:extLst>
+              <a:ext uri="{FF2B5EF4-FFF2-40B4-BE49-F238E27FC236}">
+                <a16:creationId xmlns:a16="http://schemas.microsoft.com/office/drawing/2014/main" id="{080E776B-F115-E77E-0989-BA31146D8A48}"/>
+              </a:ext>
+            </a:extLst>
+          </p:cNvPr>
+          <p:cNvCxnSpPr>
+            <a:cxnSpLocks/>
+            <a:stCxn id="8" idx="3"/>
+            <a:endCxn id="7" idx="3"/>
+          </p:cNvCxnSpPr>
+          <p:nvPr/>
+        </p:nvCxnSpPr>
+        <p:spPr>
+          <a:xfrm>
+            <a:off x="11091000" y="2767185"/>
+            <a:ext cx="96212" cy="1997712"/>
+          </a:xfrm>
+          <a:prstGeom prst="curvedConnector3">
+            <a:avLst>
+              <a:gd name="adj1" fmla="val 337600"/>
+            </a:avLst>
+          </a:prstGeom>
+          <a:ln>
+            <a:tailEnd type="triangle"/>
+          </a:ln>
+        </p:spPr>
+        <p:style>
+          <a:lnRef idx="1">
+            <a:schemeClr val="accent1"/>
+          </a:lnRef>
+          <a:fillRef idx="0">
+            <a:schemeClr val="accent1"/>
+          </a:fillRef>
+          <a:effectRef idx="0">
+            <a:schemeClr val="accent1"/>
+          </a:effectRef>
+          <a:fontRef idx="minor">
+            <a:schemeClr val="tx1"/>
+          </a:fontRef>
+        </p:style>
+      </p:cxnSp>
+      <p:cxnSp>
+        <p:nvCxnSpPr>
+          <p:cNvPr id="11" name="Connector: Curved 10">
+            <a:extLst>
+              <a:ext uri="{FF2B5EF4-FFF2-40B4-BE49-F238E27FC236}">
+                <a16:creationId xmlns:a16="http://schemas.microsoft.com/office/drawing/2014/main" id="{0F1B71AE-D554-6ACD-2356-B8ABB40EC79F}"/>
+              </a:ext>
+            </a:extLst>
+          </p:cNvPr>
+          <p:cNvCxnSpPr>
+            <a:cxnSpLocks/>
+            <a:stCxn id="7" idx="1"/>
+            <a:endCxn id="8" idx="1"/>
+          </p:cNvCxnSpPr>
+          <p:nvPr/>
+        </p:nvCxnSpPr>
+        <p:spPr>
+          <a:xfrm rot="10800000">
+            <a:off x="7895017" y="2767185"/>
+            <a:ext cx="96212" cy="1997712"/>
+          </a:xfrm>
+          <a:prstGeom prst="curvedConnector3">
+            <a:avLst>
+              <a:gd name="adj1" fmla="val 337600"/>
+            </a:avLst>
+          </a:prstGeom>
+          <a:ln>
+            <a:tailEnd type="triangle"/>
+          </a:ln>
+        </p:spPr>
+        <p:style>
+          <a:lnRef idx="1">
+            <a:schemeClr val="accent1"/>
+          </a:lnRef>
+          <a:fillRef idx="0">
+            <a:schemeClr val="accent1"/>
+          </a:fillRef>
+          <a:effectRef idx="0">
+            <a:schemeClr val="accent1"/>
+          </a:effectRef>
+          <a:fontRef idx="minor">
+            <a:schemeClr val="tx1"/>
+          </a:fontRef>
+        </p:style>
+      </p:cxnSp>
     </p:spTree>
     <p:extLst>
       <p:ext uri="{BB962C8B-B14F-4D97-AF65-F5344CB8AC3E}">
@@ -23885,20 +25217,44 @@
         </p:nvSpPr>
         <p:spPr>
           <a:xfrm>
-            <a:off x="358044" y="1341438"/>
-            <a:ext cx="11647689" cy="4911725"/>
+            <a:off x="358045" y="1341438"/>
+            <a:ext cx="6434642" cy="4911725"/>
           </a:xfrm>
         </p:spPr>
         <p:txBody>
-          <a:bodyPr/>
+          <a:bodyPr>
+            <a:normAutofit fontScale="85000" lnSpcReduction="10000"/>
+          </a:bodyPr>
           <a:lstStyle/>
           <a:p>
-            <a:pPr marL="0" indent="0">
-              <a:buNone/>
-            </a:pPr>
             <a:r>
               <a:rPr lang="en-US" dirty="0"/>
-              <a:t>		</a:t>
+              <a:t>First Proposed by H.A.P. Blom in 1984. [2]</a:t>
+            </a:r>
+          </a:p>
+          <a:p>
+            <a:r>
+              <a:rPr lang="en-US" dirty="0"/>
+              <a:t>Proposed as a high-efficiency solution to estimation of processes with Markovian coefficients. </a:t>
+            </a:r>
+          </a:p>
+          <a:p>
+            <a:pPr lvl="1"/>
+            <a:r>
+              <a:rPr lang="en-US" dirty="0"/>
+              <a:t>Processes where the parameters evolve according to a Markov process.</a:t>
+            </a:r>
+          </a:p>
+          <a:p>
+            <a:r>
+              <a:rPr lang="en-US" dirty="0"/>
+              <a:t>Utilizes multiple models to propagate the system and based on the innovations of each model the best update is selected and mixed with the other outputs.</a:t>
+            </a:r>
+          </a:p>
+          <a:p>
+            <a:r>
+              <a:rPr lang="en-US" dirty="0"/>
+              <a:t>This allows for complex dynamics to be estimated with various simple kinematic models.</a:t>
             </a:r>
           </a:p>
           <a:p>
@@ -23906,6 +25262,99 @@
           </a:p>
           <a:p>
             <a:endParaRPr lang="en-US" sz="2400" dirty="0"/>
+          </a:p>
+        </p:txBody>
+      </p:sp>
+      <p:pic>
+        <p:nvPicPr>
+          <p:cNvPr id="6" name="Picture 5">
+            <a:extLst>
+              <a:ext uri="{FF2B5EF4-FFF2-40B4-BE49-F238E27FC236}">
+                <a16:creationId xmlns:a16="http://schemas.microsoft.com/office/drawing/2014/main" id="{968663F7-40CB-606C-444A-1A9D435E3294}"/>
+              </a:ext>
+            </a:extLst>
+          </p:cNvPr>
+          <p:cNvPicPr>
+            <a:picLocks noChangeAspect="1"/>
+          </p:cNvPicPr>
+          <p:nvPr/>
+        </p:nvPicPr>
+        <p:blipFill>
+          <a:blip r:embed="rId2">
+            <a:clrChange>
+              <a:clrFrom>
+                <a:srgbClr val="FFFFFF"/>
+              </a:clrFrom>
+              <a:clrTo>
+                <a:srgbClr val="FFFFFF">
+                  <a:alpha val="0"/>
+                </a:srgbClr>
+              </a:clrTo>
+            </a:clrChange>
+          </a:blip>
+          <a:stretch>
+            <a:fillRect/>
+          </a:stretch>
+        </p:blipFill>
+        <p:spPr>
+          <a:xfrm>
+            <a:off x="6927034" y="1723069"/>
+            <a:ext cx="4674019" cy="3514715"/>
+          </a:xfrm>
+          <a:prstGeom prst="rect">
+            <a:avLst/>
+          </a:prstGeom>
+        </p:spPr>
+      </p:pic>
+      <p:sp>
+        <p:nvSpPr>
+          <p:cNvPr id="8" name="TextBox 7">
+            <a:extLst>
+              <a:ext uri="{FF2B5EF4-FFF2-40B4-BE49-F238E27FC236}">
+                <a16:creationId xmlns:a16="http://schemas.microsoft.com/office/drawing/2014/main" id="{478DC7B9-DB55-10BC-E92E-DC66C891E698}"/>
+              </a:ext>
+            </a:extLst>
+          </p:cNvPr>
+          <p:cNvSpPr txBox="1"/>
+          <p:nvPr/>
+        </p:nvSpPr>
+        <p:spPr>
+          <a:xfrm>
+            <a:off x="11459497" y="5183747"/>
+            <a:ext cx="440344" cy="369332"/>
+          </a:xfrm>
+          <a:prstGeom prst="rect">
+            <a:avLst/>
+          </a:prstGeom>
+          <a:noFill/>
+          <a:ln w="12700" cap="flat">
+            <a:noFill/>
+            <a:miter lim="400000"/>
+          </a:ln>
+          <a:effectLst/>
+        </p:spPr>
+        <p:style>
+          <a:lnRef idx="0">
+            <a:scrgbClr r="0" g="0" b="0"/>
+          </a:lnRef>
+          <a:fillRef idx="0">
+            <a:scrgbClr r="0" g="0" b="0"/>
+          </a:fillRef>
+          <a:effectRef idx="0">
+            <a:scrgbClr r="0" g="0" b="0"/>
+          </a:effectRef>
+          <a:fontRef idx="none"/>
+        </p:style>
+        <p:txBody>
+          <a:bodyPr wrap="square">
+            <a:spAutoFit/>
+          </a:bodyPr>
+          <a:lstStyle/>
+          <a:p>
+            <a:r>
+              <a:rPr lang="en-US" dirty="0"/>
+              <a:t>[2]</a:t>
+            </a:r>
           </a:p>
         </p:txBody>
       </p:sp>
@@ -25576,11 +27025,11 @@
   <p:clrMapOvr>
     <a:masterClrMapping/>
   </p:clrMapOvr>
-  <mc:AlternateContent xmlns:mc="http://schemas.openxmlformats.org/markup-compatibility/2006">
-    <mc:Choice xmlns:p14="http://schemas.microsoft.com/office/powerpoint/2010/main" Requires="p14">
+  <mc:AlternateContent xmlns:mc="http://schemas.openxmlformats.org/markup-compatibility/2006" xmlns:p14="http://schemas.microsoft.com/office/powerpoint/2010/main">
+    <mc:Choice Requires="p14">
       <p:transition p14:dur="0"/>
     </mc:Choice>
-    <mc:Fallback>
+    <mc:Fallback xmlns="">
       <p:transition/>
     </mc:Fallback>
   </mc:AlternateContent>
@@ -33381,8 +34830,8 @@
           </a:p>
         </p:txBody>
       </p:sp>
-      <mc:AlternateContent xmlns:mc="http://schemas.openxmlformats.org/markup-compatibility/2006">
-        <mc:Choice xmlns:a14="http://schemas.microsoft.com/office/drawing/2010/main" Requires="a14">
+      <mc:AlternateContent xmlns:mc="http://schemas.openxmlformats.org/markup-compatibility/2006" xmlns:a14="http://schemas.microsoft.com/office/drawing/2010/main">
+        <mc:Choice Requires="a14">
           <p:sp>
             <p:nvSpPr>
               <p:cNvPr id="6" name="TextBox 5">
@@ -33729,7 +35178,7 @@
             </p:txBody>
           </p:sp>
         </mc:Choice>
-        <mc:Fallback>
+        <mc:Fallback xmlns="">
           <p:sp>
             <p:nvSpPr>
               <p:cNvPr id="6" name="TextBox 5">

</xml_diff>